<commit_message>
component stuuf and block diagram fixes
</commit_message>
<xml_diff>
--- a/CPU block diagram.pptx
+++ b/CPU block diagram.pptx
@@ -289,7 +289,7 @@
             <a:fld id="{AA76FD35-F9F8-4A42-9A4F-278A7EAB713E}" type="datetimeFigureOut">
               <a:rPr lang="en-US" smtClean="0"/>
               <a:pPr/>
-              <a:t>10/27/2025</a:t>
+              <a:t>10/29/2025</a:t>
             </a:fld>
             <a:endParaRPr lang="en-US"/>
           </a:p>
@@ -456,7 +456,7 @@
             <a:fld id="{AA76FD35-F9F8-4A42-9A4F-278A7EAB713E}" type="datetimeFigureOut">
               <a:rPr lang="en-US" smtClean="0"/>
               <a:pPr/>
-              <a:t>10/27/2025</a:t>
+              <a:t>10/29/2025</a:t>
             </a:fld>
             <a:endParaRPr lang="en-US"/>
           </a:p>
@@ -633,7 +633,7 @@
             <a:fld id="{AA76FD35-F9F8-4A42-9A4F-278A7EAB713E}" type="datetimeFigureOut">
               <a:rPr lang="en-US" smtClean="0"/>
               <a:pPr/>
-              <a:t>10/27/2025</a:t>
+              <a:t>10/29/2025</a:t>
             </a:fld>
             <a:endParaRPr lang="en-US"/>
           </a:p>
@@ -800,7 +800,7 @@
             <a:fld id="{AA76FD35-F9F8-4A42-9A4F-278A7EAB713E}" type="datetimeFigureOut">
               <a:rPr lang="en-US" smtClean="0"/>
               <a:pPr/>
-              <a:t>10/27/2025</a:t>
+              <a:t>10/29/2025</a:t>
             </a:fld>
             <a:endParaRPr lang="en-US"/>
           </a:p>
@@ -1043,7 +1043,7 @@
             <a:fld id="{AA76FD35-F9F8-4A42-9A4F-278A7EAB713E}" type="datetimeFigureOut">
               <a:rPr lang="en-US" smtClean="0"/>
               <a:pPr/>
-              <a:t>10/27/2025</a:t>
+              <a:t>10/29/2025</a:t>
             </a:fld>
             <a:endParaRPr lang="en-US"/>
           </a:p>
@@ -1328,7 +1328,7 @@
             <a:fld id="{AA76FD35-F9F8-4A42-9A4F-278A7EAB713E}" type="datetimeFigureOut">
               <a:rPr lang="en-US" smtClean="0"/>
               <a:pPr/>
-              <a:t>10/27/2025</a:t>
+              <a:t>10/29/2025</a:t>
             </a:fld>
             <a:endParaRPr lang="en-US"/>
           </a:p>
@@ -1747,7 +1747,7 @@
             <a:fld id="{AA76FD35-F9F8-4A42-9A4F-278A7EAB713E}" type="datetimeFigureOut">
               <a:rPr lang="en-US" smtClean="0"/>
               <a:pPr/>
-              <a:t>10/27/2025</a:t>
+              <a:t>10/29/2025</a:t>
             </a:fld>
             <a:endParaRPr lang="en-US"/>
           </a:p>
@@ -1862,7 +1862,7 @@
             <a:fld id="{AA76FD35-F9F8-4A42-9A4F-278A7EAB713E}" type="datetimeFigureOut">
               <a:rPr lang="en-US" smtClean="0"/>
               <a:pPr/>
-              <a:t>10/27/2025</a:t>
+              <a:t>10/29/2025</a:t>
             </a:fld>
             <a:endParaRPr lang="en-US"/>
           </a:p>
@@ -1954,7 +1954,7 @@
             <a:fld id="{AA76FD35-F9F8-4A42-9A4F-278A7EAB713E}" type="datetimeFigureOut">
               <a:rPr lang="en-US" smtClean="0"/>
               <a:pPr/>
-              <a:t>10/27/2025</a:t>
+              <a:t>10/29/2025</a:t>
             </a:fld>
             <a:endParaRPr lang="en-US"/>
           </a:p>
@@ -2228,7 +2228,7 @@
             <a:fld id="{AA76FD35-F9F8-4A42-9A4F-278A7EAB713E}" type="datetimeFigureOut">
               <a:rPr lang="en-US" smtClean="0"/>
               <a:pPr/>
-              <a:t>10/27/2025</a:t>
+              <a:t>10/29/2025</a:t>
             </a:fld>
             <a:endParaRPr lang="en-US"/>
           </a:p>
@@ -2478,7 +2478,7 @@
             <a:fld id="{AA76FD35-F9F8-4A42-9A4F-278A7EAB713E}" type="datetimeFigureOut">
               <a:rPr lang="en-US" smtClean="0"/>
               <a:pPr/>
-              <a:t>10/27/2025</a:t>
+              <a:t>10/29/2025</a:t>
             </a:fld>
             <a:endParaRPr lang="en-US"/>
           </a:p>
@@ -2688,7 +2688,7 @@
             <a:fld id="{AA76FD35-F9F8-4A42-9A4F-278A7EAB713E}" type="datetimeFigureOut">
               <a:rPr lang="en-US" smtClean="0"/>
               <a:pPr/>
-              <a:t>10/27/2025</a:t>
+              <a:t>10/29/2025</a:t>
             </a:fld>
             <a:endParaRPr lang="en-US"/>
           </a:p>
@@ -5199,7 +5199,7 @@
             <a:bodyPr vert="vert270" rtlCol="0" anchor="ctr"/>
             <a:lstStyle/>
             <a:p>
-              <a:pPr algn="ctr"/>
+              <a:pPr algn="r"/>
               <a:r>
                 <a:rPr lang="en-US" sz="1400" dirty="0" smtClean="0">
                   <a:solidFill>
@@ -5209,7 +5209,7 @@
                     </a:schemeClr>
                   </a:solidFill>
                 </a:rPr>
-                <a:t>ALU</a:t>
+                <a:t>ALU0</a:t>
               </a:r>
               <a:endParaRPr lang="en-US" sz="1600" dirty="0">
                 <a:solidFill>
@@ -6241,9 +6241,9 @@
             <a:bodyPr vert="vert270" rtlCol="0" anchor="ctr"/>
             <a:lstStyle/>
             <a:p>
-              <a:pPr algn="ctr"/>
+              <a:pPr algn="r"/>
               <a:r>
-                <a:rPr lang="en-US" sz="1400" dirty="0" smtClean="0">
+                <a:rPr lang="en-US" sz="1100" dirty="0" smtClean="0">
                   <a:solidFill>
                     <a:schemeClr val="accent6">
                       <a:lumMod val="60000"/>
@@ -6251,9 +6251,9 @@
                     </a:schemeClr>
                   </a:solidFill>
                 </a:rPr>
-                <a:t>ALU</a:t>
+                <a:t>ALU1</a:t>
               </a:r>
-              <a:endParaRPr lang="en-US" sz="1600" dirty="0">
+              <a:endParaRPr lang="en-US" sz="1200" dirty="0">
                 <a:solidFill>
                   <a:schemeClr val="accent6">
                     <a:lumMod val="60000"/>
@@ -6849,11 +6849,7 @@
             <a:p>
               <a:r>
                 <a:rPr lang="en-US" sz="900" dirty="0" smtClean="0"/>
-                <a:t>A</a:t>
-              </a:r>
-              <a:r>
-                <a:rPr lang="en-US" sz="900" dirty="0" smtClean="0"/>
-                <a:t>ddress</a:t>
+                <a:t>Address</a:t>
               </a:r>
               <a:endParaRPr lang="en-US" sz="900" dirty="0"/>
             </a:p>
@@ -8386,11 +8382,7 @@
             <a:pPr algn="r"/>
             <a:r>
               <a:rPr lang="en-US" sz="600" dirty="0" smtClean="0"/>
-              <a:t>Instruction </a:t>
-            </a:r>
-            <a:r>
-              <a:rPr lang="en-US" sz="600" dirty="0" smtClean="0"/>
-              <a:t>[15-12]</a:t>
+              <a:t>Instruction [15-12]</a:t>
             </a:r>
             <a:endParaRPr lang="en-US" sz="600" dirty="0"/>
           </a:p>
@@ -8873,8 +8865,8 @@
           </p:nvCxnSpPr>
           <p:spPr>
             <a:xfrm>
-              <a:off x="5334000" y="4550835"/>
-              <a:ext cx="304800" cy="0"/>
+              <a:off x="5486400" y="4572000"/>
+              <a:ext cx="152400" cy="0"/>
             </a:xfrm>
             <a:prstGeom prst="straightConnector1">
               <a:avLst/>
@@ -8937,7 +8929,7 @@
               </p:nvCxnSpPr>
               <p:spPr>
                 <a:xfrm>
-                  <a:off x="5334000" y="1676400"/>
+                  <a:off x="5486400" y="1676400"/>
                   <a:ext cx="0" cy="3657600"/>
                 </a:xfrm>
                 <a:prstGeom prst="line">
@@ -8986,8 +8978,8 @@
                 </p:nvCxnSpPr>
                 <p:spPr>
                   <a:xfrm>
-                    <a:off x="5334000" y="1676400"/>
-                    <a:ext cx="990600" cy="0"/>
+                    <a:off x="5486400" y="1676400"/>
+                    <a:ext cx="838200" cy="0"/>
                   </a:xfrm>
                   <a:prstGeom prst="straightConnector1">
                     <a:avLst/>
@@ -9023,7 +9015,7 @@
                 <p:spPr>
                   <a:xfrm>
                     <a:off x="5105400" y="5334000"/>
-                    <a:ext cx="228600" cy="0"/>
+                    <a:ext cx="381000" cy="0"/>
                   </a:xfrm>
                   <a:prstGeom prst="line">
                     <a:avLst/>
@@ -9127,7 +9119,7 @@
             </p:nvSpPr>
             <p:spPr>
               <a:xfrm>
-                <a:off x="5311768" y="4522796"/>
+                <a:off x="5463113" y="4550830"/>
                 <a:ext cx="45719" cy="45719"/>
               </a:xfrm>
               <a:prstGeom prst="ellipse">
@@ -10179,15 +10171,7 @@
                         <a:pPr algn="r"/>
                         <a:r>
                           <a:rPr lang="en-US" sz="600" dirty="0" smtClean="0"/>
-                          <a:t>Instruction </a:t>
-                        </a:r>
-                        <a:r>
-                          <a:rPr lang="en-US" sz="600" dirty="0" smtClean="0"/>
-                          <a:t>[5-0</a:t>
-                        </a:r>
-                        <a:r>
-                          <a:rPr lang="en-US" sz="600" dirty="0" smtClean="0"/>
-                          <a:t>]</a:t>
+                          <a:t>Instruction [5-0]</a:t>
                         </a:r>
                         <a:endParaRPr lang="en-US" sz="600" dirty="0"/>
                       </a:p>
@@ -10292,11 +10276,7 @@
                         <a:pPr algn="r"/>
                         <a:r>
                           <a:rPr lang="en-US" sz="600" dirty="0" smtClean="0"/>
-                          <a:t>Instruction </a:t>
-                        </a:r>
-                        <a:r>
-                          <a:rPr lang="en-US" sz="600" dirty="0" smtClean="0"/>
-                          <a:t>[5-3]</a:t>
+                          <a:t>Instruction [5-3]</a:t>
                         </a:r>
                         <a:endParaRPr lang="en-US" sz="600" dirty="0"/>
                       </a:p>
@@ -10402,11 +10382,7 @@
                         <a:pPr algn="r"/>
                         <a:r>
                           <a:rPr lang="en-US" sz="600" dirty="0" smtClean="0"/>
-                          <a:t>Instruction </a:t>
-                        </a:r>
-                        <a:r>
-                          <a:rPr lang="en-US" sz="600" dirty="0" smtClean="0"/>
-                          <a:t>[11-9]</a:t>
+                          <a:t>Instruction [11-9]</a:t>
                         </a:r>
                         <a:endParaRPr lang="en-US" sz="600" dirty="0"/>
                       </a:p>
@@ -10476,11 +10452,7 @@
                         <a:pPr algn="r"/>
                         <a:r>
                           <a:rPr lang="en-US" sz="600" dirty="0" smtClean="0"/>
-                          <a:t>Instruction </a:t>
-                        </a:r>
-                        <a:r>
-                          <a:rPr lang="en-US" sz="600" dirty="0" smtClean="0"/>
-                          <a:t>[8-6]</a:t>
+                          <a:t>Instruction [8-6]</a:t>
                         </a:r>
                         <a:endParaRPr lang="en-US" sz="600" dirty="0"/>
                       </a:p>
@@ -10865,19 +10837,7 @@
               <a:pPr algn="r"/>
               <a:r>
                 <a:rPr lang="en-US" sz="600" dirty="0" smtClean="0"/>
-                <a:t>Instruction </a:t>
-              </a:r>
-              <a:r>
-                <a:rPr lang="en-US" sz="600" dirty="0" smtClean="0"/>
-                <a:t>[</a:t>
-              </a:r>
-              <a:r>
-                <a:rPr lang="en-US" sz="600" dirty="0" smtClean="0"/>
-                <a:t>2</a:t>
-              </a:r>
-              <a:r>
-                <a:rPr lang="en-US" sz="600" dirty="0" smtClean="0"/>
-                <a:t>-0]</a:t>
+                <a:t>Instruction [2-0]</a:t>
               </a:r>
               <a:endParaRPr lang="en-US" sz="600" dirty="0"/>
             </a:p>
@@ -11533,7 +11493,7 @@
             <a:lstStyle/>
             <a:p>
               <a:r>
-                <a:rPr lang="en-US" sz="700" dirty="0" err="1" smtClean="0">
+                <a:rPr lang="en-US" sz="700" dirty="0" smtClean="0">
                   <a:solidFill>
                     <a:schemeClr val="tx2">
                       <a:lumMod val="60000"/>
@@ -11541,7 +11501,7 @@
                     </a:schemeClr>
                   </a:solidFill>
                 </a:rPr>
-                <a:t>MemtoReg</a:t>
+                <a:t>Branch</a:t>
               </a:r>
               <a:endParaRPr lang="en-US" sz="700" dirty="0" smtClean="0">
                 <a:solidFill>

</xml_diff>